<commit_message>
Rounding out an initial version
</commit_message>
<xml_diff>
--- a/Documentation and Notes/Cura Profiles.pptx
+++ b/Documentation and Notes/Cura Profiles.pptx
@@ -5,7 +5,7 @@
     <p:sldMasterId id="2147483658" r:id="rId1"/>
   </p:sldMasterIdLst>
   <p:notesMasterIdLst>
-    <p:notesMasterId r:id="rId16"/>
+    <p:notesMasterId r:id="rId22"/>
   </p:notesMasterIdLst>
   <p:sldIdLst>
     <p:sldId id="256" r:id="rId2"/>
@@ -13,25 +13,31 @@
     <p:sldId id="279" r:id="rId4"/>
     <p:sldId id="274" r:id="rId5"/>
     <p:sldId id="257" r:id="rId6"/>
-    <p:sldId id="285" r:id="rId7"/>
-    <p:sldId id="272" r:id="rId8"/>
-    <p:sldId id="282" r:id="rId9"/>
-    <p:sldId id="277" r:id="rId10"/>
-    <p:sldId id="278" r:id="rId11"/>
-    <p:sldId id="281" r:id="rId12"/>
-    <p:sldId id="283" r:id="rId13"/>
-    <p:sldId id="284" r:id="rId14"/>
-    <p:sldId id="271" r:id="rId15"/>
+    <p:sldId id="289" r:id="rId7"/>
+    <p:sldId id="288" r:id="rId8"/>
+    <p:sldId id="285" r:id="rId9"/>
+    <p:sldId id="291" r:id="rId10"/>
+    <p:sldId id="272" r:id="rId11"/>
+    <p:sldId id="282" r:id="rId12"/>
+    <p:sldId id="277" r:id="rId13"/>
+    <p:sldId id="278" r:id="rId14"/>
+    <p:sldId id="281" r:id="rId15"/>
+    <p:sldId id="283" r:id="rId16"/>
+    <p:sldId id="284" r:id="rId17"/>
+    <p:sldId id="286" r:id="rId18"/>
+    <p:sldId id="287" r:id="rId19"/>
+    <p:sldId id="271" r:id="rId20"/>
+    <p:sldId id="290" r:id="rId21"/>
   </p:sldIdLst>
   <p:sldSz cx="9144000" cy="5143500" type="screen16x9"/>
   <p:notesSz cx="6858000" cy="9144000"/>
   <p:embeddedFontLst>
     <p:embeddedFont>
       <p:font typeface="Roboto" panose="020B0604020202020204" charset="0"/>
-      <p:regular r:id="rId17"/>
-      <p:bold r:id="rId18"/>
-      <p:italic r:id="rId19"/>
-      <p:boldItalic r:id="rId20"/>
+      <p:regular r:id="rId23"/>
+      <p:bold r:id="rId24"/>
+      <p:italic r:id="rId25"/>
+      <p:boldItalic r:id="rId26"/>
     </p:embeddedFont>
   </p:embeddedFontLst>
   <p:defaultTextStyle>
@@ -1026,11 +1032,15 @@
             </a:r>
             <a:r>
               <a:rPr lang="en-US" baseline="0" dirty="0" smtClean="0"/>
-              <a:t>  My point is, I’m not some internet yahoo popping off about something he has no understanding of.  I have a background doing exactly these types of things and I have put significant thought into how I would write the software to solve </a:t>
+              <a:t>  My point is, I’m not some </a:t>
             </a:r>
             <a:r>
-              <a:rPr lang="en-US" baseline="0" smtClean="0"/>
-              <a:t>these problems.</a:t>
+              <a:rPr lang="en-US" baseline="0" dirty="0" smtClean="0"/>
+              <a:t>from the internet with uninformed opinions.   </a:t>
+            </a:r>
+            <a:r>
+              <a:rPr lang="en-US" baseline="0" dirty="0" smtClean="0"/>
+              <a:t>I have a background doing exactly these types of things and I have put significant thought into how I would write the software to solve these problems.</a:t>
             </a:r>
             <a:endParaRPr lang="en-US" dirty="0"/>
           </a:p>
@@ -1453,19 +1463,7 @@
               <a:buFont typeface="Arial"/>
               <a:buNone/>
             </a:pPr>
-            <a:r>
-              <a:rPr lang="en" sz="2800" b="1">
-                <a:solidFill>
-                  <a:schemeClr val="lt1"/>
-                </a:solidFill>
-                <a:latin typeface="Roboto"/>
-                <a:ea typeface="Roboto"/>
-                <a:cs typeface="Roboto"/>
-                <a:sym typeface="Roboto"/>
-              </a:rPr>
-              <a:t>To To bring user-friendly desktop pickTo bring user-friendly desktop pick-and-place technology to the maker community.-and-place technology to the maker community.brTo bring user-friendly desktop pick-and-place technology to the maker community.inTo bring user-friendly desktop pick-and-place technology to the maker community.g user-friendly desktop pick-and-place technology to the maker community.To bring user-friendly desktop pick-and-place technology to the maker community.</a:t>
-            </a:r>
-            <a:endParaRPr/>
+            <a:endParaRPr dirty="0"/>
           </a:p>
         </p:txBody>
       </p:sp>
@@ -2608,110 +2606,230 @@
       </p:sp>
       <p:sp>
         <p:nvSpPr>
-          <p:cNvPr id="8" name="Google Shape;28;p5"/>
+          <p:cNvPr id="7" name="Google Shape;28;p5"/>
           <p:cNvSpPr txBox="1">
             <a:spLocks noGrp="1"/>
           </p:cNvSpPr>
           <p:nvPr>
-            <p:ph type="body" idx="1" hasCustomPrompt="1"/>
+            <p:ph type="body" idx="1"/>
           </p:nvPr>
         </p:nvSpPr>
         <p:spPr>
           <a:xfrm>
             <a:off x="264299" y="1216650"/>
-            <a:ext cx="8643957" cy="3798000"/>
+            <a:ext cx="8611477" cy="3798000"/>
           </a:xfrm>
           <a:prstGeom prst="rect">
             <a:avLst/>
           </a:prstGeom>
-          <a:noFill/>
-          <a:ln>
-            <a:noFill/>
-          </a:ln>
         </p:spPr>
         <p:txBody>
           <a:bodyPr spcFirstLastPara="1" wrap="square" lIns="91425" tIns="91425" rIns="91425" bIns="91425" anchor="t" anchorCtr="0">
             <a:noAutofit/>
           </a:bodyPr>
           <a:lstStyle>
-            <a:lvl1pPr>
-              <a:defRPr lang="en-US" dirty="0" smtClean="0">
-                <a:solidFill>
-                  <a:srgbClr val="000000"/>
-                </a:solidFill>
-              </a:defRPr>
-            </a:lvl1pPr>
-            <a:lvl2pPr>
-              <a:defRPr lang="en-US" sz="1600" baseline="0" dirty="0" smtClean="0">
-                <a:solidFill>
-                  <a:srgbClr val="000000"/>
-                </a:solidFill>
-              </a:defRPr>
-            </a:lvl2pPr>
-            <a:lvl3pPr>
-              <a:defRPr dirty="0">
-                <a:solidFill>
-                  <a:srgbClr val="000000"/>
-                </a:solidFill>
-              </a:defRPr>
-            </a:lvl3pPr>
-          </a:lstStyle>
-          <a:p>
-            <a:pPr marL="228600" lvl="0" indent="-228600">
+            <a:lvl1pPr marL="228600" lvl="0" indent="-228600" rtl="0">
               <a:lnSpc>
                 <a:spcPct val="100000"/>
               </a:lnSpc>
+              <a:spcBef>
+                <a:spcPts val="0"/>
+              </a:spcBef>
+              <a:spcAft>
+                <a:spcPts val="0"/>
+              </a:spcAft>
               <a:buClr>
                 <a:srgbClr val="000000"/>
               </a:buClr>
               <a:buSzPct val="125000"/>
               <a:buFont typeface="Arial" panose="020B0604020202020204" pitchFamily="34" charset="0"/>
               <a:buChar char="•"/>
-            </a:pPr>
-            <a:r>
-              <a:rPr lang="en-US" dirty="0" smtClean="0"/>
-              <a:t>Level1</a:t>
-            </a:r>
-          </a:p>
-          <a:p>
-            <a:pPr marL="457200" lvl="1" indent="-228600">
+              <a:defRPr b="1">
+                <a:solidFill>
+                  <a:srgbClr val="000000"/>
+                </a:solidFill>
+              </a:defRPr>
+            </a:lvl1pPr>
+            <a:lvl2pPr marL="457200" lvl="1" indent="-228600" rtl="0">
               <a:lnSpc>
                 <a:spcPct val="100000"/>
               </a:lnSpc>
               <a:spcBef>
                 <a:spcPts val="600"/>
               </a:spcBef>
+              <a:spcAft>
+                <a:spcPts val="0"/>
+              </a:spcAft>
               <a:buClr>
                 <a:srgbClr val="000000"/>
               </a:buClr>
               <a:buSzPct val="125000"/>
               <a:buFont typeface="Arial" panose="020B0604020202020204" pitchFamily="34" charset="0"/>
               <a:buChar char="•"/>
-            </a:pPr>
-            <a:r>
-              <a:rPr lang="en-US" dirty="0" smtClean="0"/>
-              <a:t>Level 2</a:t>
-            </a:r>
-          </a:p>
-          <a:p>
-            <a:pPr marL="685800" lvl="2" indent="-228600">
+              <a:defRPr sz="1600" b="1" baseline="0">
+                <a:solidFill>
+                  <a:srgbClr val="000000"/>
+                </a:solidFill>
+              </a:defRPr>
+            </a:lvl2pPr>
+            <a:lvl3pPr marL="685800" lvl="2" indent="-228600" rtl="0">
               <a:lnSpc>
                 <a:spcPct val="100000"/>
               </a:lnSpc>
               <a:spcBef>
                 <a:spcPts val="600"/>
               </a:spcBef>
+              <a:spcAft>
+                <a:spcPts val="0"/>
+              </a:spcAft>
               <a:buClr>
                 <a:srgbClr val="000000"/>
               </a:buClr>
               <a:buSzPct val="125000"/>
               <a:buFont typeface="Arial" panose="020B0604020202020204" pitchFamily="34" charset="0"/>
               <a:buChar char="•"/>
-            </a:pPr>
-            <a:r>
-              <a:rPr lang="en-US" dirty="0" smtClean="0"/>
-              <a:t>Level 3</a:t>
-            </a:r>
+              <a:defRPr sz="1400" b="1">
+                <a:solidFill>
+                  <a:srgbClr val="000000"/>
+                </a:solidFill>
+              </a:defRPr>
+            </a:lvl3pPr>
+            <a:lvl4pPr marL="1828800" lvl="3" indent="-317500" rtl="0">
+              <a:lnSpc>
+                <a:spcPct val="100000"/>
+              </a:lnSpc>
+              <a:spcBef>
+                <a:spcPts val="1200"/>
+              </a:spcBef>
+              <a:spcAft>
+                <a:spcPts val="0"/>
+              </a:spcAft>
+              <a:buClr>
+                <a:srgbClr val="000000"/>
+              </a:buClr>
+              <a:buSzPts val="1400"/>
+              <a:buChar char="●"/>
+              <a:defRPr b="1">
+                <a:solidFill>
+                  <a:srgbClr val="000000"/>
+                </a:solidFill>
+              </a:defRPr>
+            </a:lvl4pPr>
+            <a:lvl5pPr marL="2286000" lvl="4" indent="-317500" rtl="0">
+              <a:lnSpc>
+                <a:spcPct val="100000"/>
+              </a:lnSpc>
+              <a:spcBef>
+                <a:spcPts val="1200"/>
+              </a:spcBef>
+              <a:spcAft>
+                <a:spcPts val="0"/>
+              </a:spcAft>
+              <a:buClr>
+                <a:srgbClr val="000000"/>
+              </a:buClr>
+              <a:buSzPts val="1400"/>
+              <a:buChar char="○"/>
+              <a:defRPr b="1">
+                <a:solidFill>
+                  <a:srgbClr val="000000"/>
+                </a:solidFill>
+              </a:defRPr>
+            </a:lvl5pPr>
+            <a:lvl6pPr marL="2743200" lvl="5" indent="-317500" rtl="0">
+              <a:lnSpc>
+                <a:spcPct val="100000"/>
+              </a:lnSpc>
+              <a:spcBef>
+                <a:spcPts val="1200"/>
+              </a:spcBef>
+              <a:spcAft>
+                <a:spcPts val="0"/>
+              </a:spcAft>
+              <a:buClr>
+                <a:srgbClr val="000000"/>
+              </a:buClr>
+              <a:buSzPts val="1400"/>
+              <a:buChar char="■"/>
+              <a:defRPr b="1">
+                <a:solidFill>
+                  <a:srgbClr val="000000"/>
+                </a:solidFill>
+              </a:defRPr>
+            </a:lvl6pPr>
+            <a:lvl7pPr marL="3200400" lvl="6" indent="-317500" rtl="0">
+              <a:lnSpc>
+                <a:spcPct val="100000"/>
+              </a:lnSpc>
+              <a:spcBef>
+                <a:spcPts val="1200"/>
+              </a:spcBef>
+              <a:spcAft>
+                <a:spcPts val="0"/>
+              </a:spcAft>
+              <a:buClr>
+                <a:srgbClr val="000000"/>
+              </a:buClr>
+              <a:buSzPts val="1400"/>
+              <a:buChar char="●"/>
+              <a:defRPr b="1">
+                <a:solidFill>
+                  <a:srgbClr val="000000"/>
+                </a:solidFill>
+              </a:defRPr>
+            </a:lvl7pPr>
+            <a:lvl8pPr marL="3657600" lvl="7" indent="-317500" rtl="0">
+              <a:lnSpc>
+                <a:spcPct val="100000"/>
+              </a:lnSpc>
+              <a:spcBef>
+                <a:spcPts val="1200"/>
+              </a:spcBef>
+              <a:spcAft>
+                <a:spcPts val="0"/>
+              </a:spcAft>
+              <a:buClr>
+                <a:srgbClr val="000000"/>
+              </a:buClr>
+              <a:buSzPts val="1400"/>
+              <a:buChar char="○"/>
+              <a:defRPr b="1">
+                <a:solidFill>
+                  <a:srgbClr val="000000"/>
+                </a:solidFill>
+              </a:defRPr>
+            </a:lvl8pPr>
+            <a:lvl9pPr marL="4114800" lvl="8" indent="-317500" rtl="0">
+              <a:lnSpc>
+                <a:spcPct val="100000"/>
+              </a:lnSpc>
+              <a:spcBef>
+                <a:spcPts val="1200"/>
+              </a:spcBef>
+              <a:spcAft>
+                <a:spcPts val="1200"/>
+              </a:spcAft>
+              <a:buClr>
+                <a:srgbClr val="000000"/>
+              </a:buClr>
+              <a:buSzPts val="1400"/>
+              <a:buChar char="■"/>
+              <a:defRPr b="1">
+                <a:solidFill>
+                  <a:srgbClr val="000000"/>
+                </a:solidFill>
+              </a:defRPr>
+            </a:lvl9pPr>
+          </a:lstStyle>
+          <a:p>
+            <a:endParaRPr lang="en-US" dirty="0" smtClean="0"/>
+          </a:p>
+          <a:p>
+            <a:pPr lvl="1"/>
+            <a:endParaRPr lang="en-US" dirty="0" smtClean="0"/>
+          </a:p>
+          <a:p>
+            <a:pPr lvl="2"/>
             <a:endParaRPr dirty="0"/>
           </a:p>
         </p:txBody>
@@ -2758,46 +2876,6 @@
       </p:grpSpPr>
       <p:sp>
         <p:nvSpPr>
-          <p:cNvPr id="25" name="Google Shape;25;p5"/>
-          <p:cNvSpPr/>
-          <p:nvPr/>
-        </p:nvSpPr>
-        <p:spPr>
-          <a:xfrm rot="10800000" flipH="1">
-            <a:off x="0" y="1686000"/>
-            <a:ext cx="9144000" cy="3457500"/>
-          </a:xfrm>
-          <a:prstGeom prst="rect">
-            <a:avLst/>
-          </a:prstGeom>
-          <a:solidFill>
-            <a:schemeClr val="accent4"/>
-          </a:solidFill>
-          <a:ln>
-            <a:noFill/>
-          </a:ln>
-        </p:spPr>
-        <p:txBody>
-          <a:bodyPr spcFirstLastPara="1" wrap="square" lIns="91425" tIns="91425" rIns="91425" bIns="91425" anchor="ctr" anchorCtr="0">
-            <a:noAutofit/>
-          </a:bodyPr>
-          <a:lstStyle/>
-          <a:p>
-            <a:pPr marL="0" lvl="0" indent="0" algn="l" rtl="0">
-              <a:spcBef>
-                <a:spcPts val="0"/>
-              </a:spcBef>
-              <a:spcAft>
-                <a:spcPts val="0"/>
-              </a:spcAft>
-              <a:buNone/>
-            </a:pPr>
-            <a:endParaRPr/>
-          </a:p>
-        </p:txBody>
-      </p:sp>
-      <p:sp>
-        <p:nvSpPr>
           <p:cNvPr id="26" name="Google Shape;26;p5"/>
           <p:cNvSpPr/>
           <p:nvPr/>
@@ -2827,6 +2905,46 @@
             </a:gsLst>
             <a:lin ang="16200038" scaled="0"/>
           </a:gradFill>
+          <a:ln>
+            <a:noFill/>
+          </a:ln>
+        </p:spPr>
+        <p:txBody>
+          <a:bodyPr spcFirstLastPara="1" wrap="square" lIns="91425" tIns="91425" rIns="91425" bIns="91425" anchor="ctr" anchorCtr="0">
+            <a:noAutofit/>
+          </a:bodyPr>
+          <a:lstStyle/>
+          <a:p>
+            <a:pPr marL="0" lvl="0" indent="0" algn="l" rtl="0">
+              <a:spcBef>
+                <a:spcPts val="0"/>
+              </a:spcBef>
+              <a:spcAft>
+                <a:spcPts val="0"/>
+              </a:spcAft>
+              <a:buNone/>
+            </a:pPr>
+            <a:endParaRPr/>
+          </a:p>
+        </p:txBody>
+      </p:sp>
+      <p:sp>
+        <p:nvSpPr>
+          <p:cNvPr id="25" name="Google Shape;25;p5"/>
+          <p:cNvSpPr/>
+          <p:nvPr/>
+        </p:nvSpPr>
+        <p:spPr>
+          <a:xfrm rot="10800000" flipH="1">
+            <a:off x="0" y="1686000"/>
+            <a:ext cx="9144000" cy="3457500"/>
+          </a:xfrm>
+          <a:prstGeom prst="rect">
+            <a:avLst/>
+          </a:prstGeom>
+          <a:solidFill>
+            <a:schemeClr val="accent4"/>
+          </a:solidFill>
           <a:ln>
             <a:noFill/>
           </a:ln>
@@ -3868,6 +3986,13 @@
   <p:clrMapOvr>
     <a:masterClrMapping/>
   </p:clrMapOvr>
+  <p:timing>
+    <p:tnLst>
+      <p:par>
+        <p:cTn id="1" dur="indefinite" restart="never" nodeType="tmRoot"/>
+      </p:par>
+    </p:tnLst>
+  </p:timing>
 </p:sldLayout>
 </file>
 
@@ -7857,6 +7982,452 @@
       </p:grpSpPr>
       <p:sp>
         <p:nvSpPr>
+          <p:cNvPr id="5" name="Title 4"/>
+          <p:cNvSpPr>
+            <a:spLocks noGrp="1"/>
+          </p:cNvSpPr>
+          <p:nvPr>
+            <p:ph type="title"/>
+          </p:nvPr>
+        </p:nvSpPr>
+        <p:spPr/>
+        <p:txBody>
+          <a:bodyPr/>
+          <a:lstStyle/>
+          <a:p>
+            <a:r>
+              <a:rPr lang="en-US" dirty="0" smtClean="0"/>
+              <a:t>Problems</a:t>
+            </a:r>
+            <a:endParaRPr lang="en-US" dirty="0"/>
+          </a:p>
+        </p:txBody>
+      </p:sp>
+      <p:sp>
+        <p:nvSpPr>
+          <p:cNvPr id="3" name="Text Placeholder 2"/>
+          <p:cNvSpPr>
+            <a:spLocks noGrp="1"/>
+          </p:cNvSpPr>
+          <p:nvPr>
+            <p:ph type="body" idx="1"/>
+          </p:nvPr>
+        </p:nvSpPr>
+        <p:spPr/>
+        <p:txBody>
+          <a:bodyPr/>
+          <a:lstStyle/>
+          <a:p>
+            <a:r>
+              <a:rPr lang="en-US" dirty="0"/>
+              <a:t>Duplication of controls on User </a:t>
+            </a:r>
+            <a:r>
+              <a:rPr lang="en-US" dirty="0" smtClean="0"/>
+              <a:t>Interface</a:t>
+            </a:r>
+          </a:p>
+          <a:p>
+            <a:pPr lvl="1"/>
+            <a:r>
+              <a:rPr lang="en-US" dirty="0"/>
+              <a:t>2 controls for 1 setting is </a:t>
+            </a:r>
+            <a:r>
+              <a:rPr lang="en-US" i="1" dirty="0" smtClean="0">
+                <a:solidFill>
+                  <a:srgbClr val="8E0000"/>
+                </a:solidFill>
+              </a:rPr>
+              <a:t>red flag</a:t>
+            </a:r>
+            <a:r>
+              <a:rPr lang="en-US" dirty="0" smtClean="0"/>
+              <a:t> </a:t>
+            </a:r>
+            <a:r>
+              <a:rPr lang="en-US" dirty="0"/>
+              <a:t>there is a design </a:t>
+            </a:r>
+            <a:r>
+              <a:rPr lang="en-US" dirty="0" smtClean="0"/>
+              <a:t>issue</a:t>
+            </a:r>
+          </a:p>
+          <a:p>
+            <a:pPr lvl="1"/>
+            <a:r>
+              <a:rPr lang="en-US" dirty="0"/>
+              <a:t>Users find it confusing that settings are </a:t>
+            </a:r>
+            <a:r>
+              <a:rPr lang="en-US" dirty="0" smtClean="0"/>
+              <a:t>linked</a:t>
+            </a:r>
+          </a:p>
+          <a:p>
+            <a:pPr lvl="2"/>
+            <a:r>
+              <a:rPr lang="en-US" dirty="0" smtClean="0"/>
+              <a:t>Non-standard/unique approaches are best avoided</a:t>
+            </a:r>
+            <a:endParaRPr lang="en-US" dirty="0"/>
+          </a:p>
+          <a:p>
+            <a:endParaRPr lang="en-US" dirty="0"/>
+          </a:p>
+        </p:txBody>
+      </p:sp>
+      <p:sp>
+        <p:nvSpPr>
+          <p:cNvPr id="6" name="Text Placeholder 5"/>
+          <p:cNvSpPr>
+            <a:spLocks noGrp="1"/>
+          </p:cNvSpPr>
+          <p:nvPr>
+            <p:ph type="body" idx="4294967295"/>
+          </p:nvPr>
+        </p:nvSpPr>
+        <p:spPr>
+          <a:xfrm>
+            <a:off x="4795454" y="1216650"/>
+            <a:ext cx="4112802" cy="3798000"/>
+          </a:xfrm>
+        </p:spPr>
+        <p:txBody>
+          <a:bodyPr/>
+          <a:lstStyle/>
+          <a:p>
+            <a:endParaRPr lang="en-US" dirty="0"/>
+          </a:p>
+        </p:txBody>
+      </p:sp>
+      <p:pic>
+        <p:nvPicPr>
+          <p:cNvPr id="10" name="Picture 9"/>
+          <p:cNvPicPr>
+            <a:picLocks noChangeAspect="1"/>
+          </p:cNvPicPr>
+          <p:nvPr/>
+        </p:nvPicPr>
+        <p:blipFill>
+          <a:blip r:embed="rId2"/>
+          <a:stretch>
+            <a:fillRect/>
+          </a:stretch>
+        </p:blipFill>
+        <p:spPr>
+          <a:xfrm>
+            <a:off x="5929914" y="3094410"/>
+            <a:ext cx="3048983" cy="1920240"/>
+          </a:xfrm>
+          <a:prstGeom prst="rect">
+            <a:avLst/>
+          </a:prstGeom>
+          <a:ln w="19050">
+            <a:solidFill>
+              <a:schemeClr val="bg2"/>
+            </a:solidFill>
+          </a:ln>
+        </p:spPr>
+      </p:pic>
+      <p:pic>
+        <p:nvPicPr>
+          <p:cNvPr id="11" name="Picture 10"/>
+          <p:cNvPicPr>
+            <a:picLocks noChangeAspect="1"/>
+          </p:cNvPicPr>
+          <p:nvPr/>
+        </p:nvPicPr>
+        <p:blipFill>
+          <a:blip r:embed="rId3"/>
+          <a:stretch>
+            <a:fillRect/>
+          </a:stretch>
+        </p:blipFill>
+        <p:spPr>
+          <a:xfrm>
+            <a:off x="4344661" y="1065714"/>
+            <a:ext cx="3048983" cy="1920240"/>
+          </a:xfrm>
+          <a:prstGeom prst="rect">
+            <a:avLst/>
+          </a:prstGeom>
+          <a:ln w="19050">
+            <a:solidFill>
+              <a:schemeClr val="bg2"/>
+            </a:solidFill>
+          </a:ln>
+        </p:spPr>
+      </p:pic>
+    </p:spTree>
+    <p:extLst>
+      <p:ext uri="{BB962C8B-B14F-4D97-AF65-F5344CB8AC3E}">
+        <p14:creationId xmlns:p14="http://schemas.microsoft.com/office/powerpoint/2010/main" val="2503677090"/>
+      </p:ext>
+    </p:extLst>
+  </p:cSld>
+  <p:clrMapOvr>
+    <a:masterClrMapping/>
+  </p:clrMapOvr>
+  <p:timing>
+    <p:tnLst>
+      <p:par>
+        <p:cTn id="1" dur="indefinite" restart="never" nodeType="tmRoot"/>
+      </p:par>
+    </p:tnLst>
+  </p:timing>
+</p:sld>
+</file>
+
+<file path=ppt/slides/slide11.xml><?xml version="1.0" encoding="utf-8"?>
+<p:sld xmlns:a="http://schemas.openxmlformats.org/drawingml/2006/main" xmlns:r="http://schemas.openxmlformats.org/officeDocument/2006/relationships" xmlns:p="http://schemas.openxmlformats.org/presentationml/2006/main">
+  <p:cSld>
+    <p:spTree>
+      <p:nvGrpSpPr>
+        <p:cNvPr id="1" name=""/>
+        <p:cNvGrpSpPr/>
+        <p:nvPr/>
+      </p:nvGrpSpPr>
+      <p:grpSpPr>
+        <a:xfrm>
+          <a:off x="0" y="0"/>
+          <a:ext cx="0" cy="0"/>
+          <a:chOff x="0" y="0"/>
+          <a:chExt cx="0" cy="0"/>
+        </a:xfrm>
+      </p:grpSpPr>
+      <p:sp>
+        <p:nvSpPr>
+          <p:cNvPr id="2" name="Title 1"/>
+          <p:cNvSpPr>
+            <a:spLocks noGrp="1"/>
+          </p:cNvSpPr>
+          <p:nvPr>
+            <p:ph type="title"/>
+          </p:nvPr>
+        </p:nvSpPr>
+        <p:spPr/>
+        <p:txBody>
+          <a:bodyPr/>
+          <a:lstStyle/>
+          <a:p>
+            <a:endParaRPr lang="en-US"/>
+          </a:p>
+        </p:txBody>
+      </p:sp>
+      <p:sp>
+        <p:nvSpPr>
+          <p:cNvPr id="3" name="Text Placeholder 2"/>
+          <p:cNvSpPr>
+            <a:spLocks noGrp="1"/>
+          </p:cNvSpPr>
+          <p:nvPr>
+            <p:ph type="body" idx="1"/>
+          </p:nvPr>
+        </p:nvSpPr>
+        <p:spPr/>
+        <p:txBody>
+          <a:bodyPr/>
+          <a:lstStyle/>
+          <a:p>
+            <a:endParaRPr lang="en-US"/>
+          </a:p>
+        </p:txBody>
+      </p:sp>
+      <p:sp>
+        <p:nvSpPr>
+          <p:cNvPr id="4" name="Text Placeholder 3"/>
+          <p:cNvSpPr>
+            <a:spLocks noGrp="1"/>
+          </p:cNvSpPr>
+          <p:nvPr>
+            <p:ph type="body" idx="13"/>
+          </p:nvPr>
+        </p:nvSpPr>
+        <p:spPr/>
+        <p:txBody>
+          <a:bodyPr/>
+          <a:lstStyle/>
+          <a:p>
+            <a:endParaRPr lang="en-US"/>
+          </a:p>
+        </p:txBody>
+      </p:sp>
+    </p:spTree>
+    <p:extLst>
+      <p:ext uri="{BB962C8B-B14F-4D97-AF65-F5344CB8AC3E}">
+        <p14:creationId xmlns:p14="http://schemas.microsoft.com/office/powerpoint/2010/main" val="2970295335"/>
+      </p:ext>
+    </p:extLst>
+  </p:cSld>
+  <p:clrMapOvr>
+    <a:masterClrMapping/>
+  </p:clrMapOvr>
+  <p:timing>
+    <p:tnLst>
+      <p:par>
+        <p:cTn id="1" dur="indefinite" restart="never" nodeType="tmRoot"/>
+      </p:par>
+    </p:tnLst>
+  </p:timing>
+</p:sld>
+</file>
+
+<file path=ppt/slides/slide12.xml><?xml version="1.0" encoding="utf-8"?>
+<p:sld xmlns:a="http://schemas.openxmlformats.org/drawingml/2006/main" xmlns:r="http://schemas.openxmlformats.org/officeDocument/2006/relationships" xmlns:p="http://schemas.openxmlformats.org/presentationml/2006/main">
+  <p:cSld>
+    <p:spTree>
+      <p:nvGrpSpPr>
+        <p:cNvPr id="1" name=""/>
+        <p:cNvGrpSpPr/>
+        <p:nvPr/>
+      </p:nvGrpSpPr>
+      <p:grpSpPr>
+        <a:xfrm>
+          <a:off x="0" y="0"/>
+          <a:ext cx="0" cy="0"/>
+          <a:chOff x="0" y="0"/>
+          <a:chExt cx="0" cy="0"/>
+        </a:xfrm>
+      </p:grpSpPr>
+      <p:sp>
+        <p:nvSpPr>
+          <p:cNvPr id="2" name="Title 1"/>
+          <p:cNvSpPr>
+            <a:spLocks noGrp="1"/>
+          </p:cNvSpPr>
+          <p:nvPr>
+            <p:ph type="title"/>
+          </p:nvPr>
+        </p:nvSpPr>
+        <p:spPr/>
+        <p:txBody>
+          <a:bodyPr/>
+          <a:lstStyle/>
+          <a:p>
+            <a:r>
+              <a:rPr lang="en-US" dirty="0" smtClean="0"/>
+              <a:t>Profile Demonstration Software</a:t>
+            </a:r>
+            <a:endParaRPr lang="en-US" dirty="0"/>
+          </a:p>
+        </p:txBody>
+      </p:sp>
+      <p:sp>
+        <p:nvSpPr>
+          <p:cNvPr id="3" name="Text Placeholder 2"/>
+          <p:cNvSpPr>
+            <a:spLocks noGrp="1"/>
+          </p:cNvSpPr>
+          <p:nvPr>
+            <p:ph type="body" idx="1"/>
+          </p:nvPr>
+        </p:nvSpPr>
+        <p:spPr>
+          <a:xfrm>
+            <a:off x="264299" y="1216650"/>
+            <a:ext cx="5473771" cy="3798000"/>
+          </a:xfrm>
+        </p:spPr>
+        <p:txBody>
+          <a:bodyPr/>
+          <a:lstStyle/>
+          <a:p>
+            <a:r>
+              <a:rPr lang="en-US" dirty="0" smtClean="0"/>
+              <a:t>A basic example to demonstrate concepts.</a:t>
+            </a:r>
+          </a:p>
+          <a:p>
+            <a:pPr lvl="1"/>
+            <a:r>
+              <a:rPr lang="en-US" dirty="0" smtClean="0"/>
+              <a:t>A minimum number of settings are incorporated.</a:t>
+            </a:r>
+          </a:p>
+          <a:p>
+            <a:pPr lvl="1"/>
+            <a:r>
+              <a:rPr lang="en-US" dirty="0" smtClean="0"/>
+              <a:t>Data validation is not complete.</a:t>
+            </a:r>
+          </a:p>
+          <a:p>
+            <a:r>
+              <a:rPr lang="en-US" dirty="0" smtClean="0"/>
+              <a:t>Not intended as “the” solution.</a:t>
+            </a:r>
+          </a:p>
+          <a:p>
+            <a:pPr lvl="1"/>
+            <a:r>
+              <a:rPr lang="en-US" dirty="0" smtClean="0"/>
+              <a:t>There are many possible valid implementations.</a:t>
+            </a:r>
+          </a:p>
+          <a:p>
+            <a:r>
+              <a:rPr lang="en-US" dirty="0" smtClean="0"/>
+              <a:t>Please focus only on the concepts and learnings.</a:t>
+            </a:r>
+          </a:p>
+          <a:p>
+            <a:pPr lvl="1"/>
+            <a:r>
+              <a:rPr lang="en-US" dirty="0" smtClean="0"/>
+              <a:t>Take away the </a:t>
+            </a:r>
+            <a:r>
+              <a:rPr lang="en-US" i="1" dirty="0" smtClean="0"/>
+              <a:t>Big Picture</a:t>
+            </a:r>
+            <a:r>
+              <a:rPr lang="en-US" dirty="0" smtClean="0"/>
+              <a:t>.</a:t>
+            </a:r>
+          </a:p>
+        </p:txBody>
+      </p:sp>
+    </p:spTree>
+    <p:extLst>
+      <p:ext uri="{BB962C8B-B14F-4D97-AF65-F5344CB8AC3E}">
+        <p14:creationId xmlns:p14="http://schemas.microsoft.com/office/powerpoint/2010/main" val="1099706727"/>
+      </p:ext>
+    </p:extLst>
+  </p:cSld>
+  <p:clrMapOvr>
+    <a:masterClrMapping/>
+  </p:clrMapOvr>
+  <p:timing>
+    <p:tnLst>
+      <p:par>
+        <p:cTn id="1" dur="indefinite" restart="never" nodeType="tmRoot"/>
+      </p:par>
+    </p:tnLst>
+  </p:timing>
+</p:sld>
+</file>
+
+<file path=ppt/slides/slide13.xml><?xml version="1.0" encoding="utf-8"?>
+<p:sld xmlns:a="http://schemas.openxmlformats.org/drawingml/2006/main" xmlns:r="http://schemas.openxmlformats.org/officeDocument/2006/relationships" xmlns:p="http://schemas.openxmlformats.org/presentationml/2006/main">
+  <p:cSld>
+    <p:spTree>
+      <p:nvGrpSpPr>
+        <p:cNvPr id="1" name=""/>
+        <p:cNvGrpSpPr/>
+        <p:nvPr/>
+      </p:nvGrpSpPr>
+      <p:grpSpPr>
+        <a:xfrm>
+          <a:off x="0" y="0"/>
+          <a:ext cx="0" cy="0"/>
+          <a:chOff x="0" y="0"/>
+          <a:chExt cx="0" cy="0"/>
+        </a:xfrm>
+      </p:grpSpPr>
+      <p:sp>
+        <p:nvSpPr>
           <p:cNvPr id="2" name="Title 1"/>
           <p:cNvSpPr>
             <a:spLocks noGrp="1"/>
@@ -8297,7 +8868,7 @@
 </p:sld>
 </file>
 
-<file path=ppt/slides/slide11.xml><?xml version="1.0" encoding="utf-8"?>
+<file path=ppt/slides/slide14.xml><?xml version="1.0" encoding="utf-8"?>
 <p:sld xmlns:a="http://schemas.openxmlformats.org/drawingml/2006/main" xmlns:r="http://schemas.openxmlformats.org/officeDocument/2006/relationships" xmlns:p="http://schemas.openxmlformats.org/presentationml/2006/main">
   <p:cSld>
     <p:spTree>
@@ -8442,7 +9013,7 @@
 </p:sld>
 </file>
 
-<file path=ppt/slides/slide12.xml><?xml version="1.0" encoding="utf-8"?>
+<file path=ppt/slides/slide15.xml><?xml version="1.0" encoding="utf-8"?>
 <p:sld xmlns:a="http://schemas.openxmlformats.org/drawingml/2006/main" xmlns:r="http://schemas.openxmlformats.org/officeDocument/2006/relationships" xmlns:p="http://schemas.openxmlformats.org/presentationml/2006/main">
   <p:cSld>
     <p:spTree>
@@ -8584,7 +9155,7 @@
 </p:sld>
 </file>
 
-<file path=ppt/slides/slide13.xml><?xml version="1.0" encoding="utf-8"?>
+<file path=ppt/slides/slide16.xml><?xml version="1.0" encoding="utf-8"?>
 <p:sld xmlns:a="http://schemas.openxmlformats.org/drawingml/2006/main" xmlns:r="http://schemas.openxmlformats.org/officeDocument/2006/relationships" xmlns:p="http://schemas.openxmlformats.org/presentationml/2006/main">
   <p:cSld>
     <p:spTree>
@@ -8934,7 +9505,283 @@
 </p:sld>
 </file>
 
-<file path=ppt/slides/slide14.xml><?xml version="1.0" encoding="utf-8"?>
+<file path=ppt/slides/slide17.xml><?xml version="1.0" encoding="utf-8"?>
+<p:sld xmlns:a="http://schemas.openxmlformats.org/drawingml/2006/main" xmlns:r="http://schemas.openxmlformats.org/officeDocument/2006/relationships" xmlns:p="http://schemas.openxmlformats.org/presentationml/2006/main">
+  <p:cSld>
+    <p:spTree>
+      <p:nvGrpSpPr>
+        <p:cNvPr id="1" name=""/>
+        <p:cNvGrpSpPr/>
+        <p:nvPr/>
+      </p:nvGrpSpPr>
+      <p:grpSpPr>
+        <a:xfrm>
+          <a:off x="0" y="0"/>
+          <a:ext cx="0" cy="0"/>
+          <a:chOff x="0" y="0"/>
+          <a:chExt cx="0" cy="0"/>
+        </a:xfrm>
+      </p:grpSpPr>
+      <p:sp>
+        <p:nvSpPr>
+          <p:cNvPr id="2" name="Title 1"/>
+          <p:cNvSpPr>
+            <a:spLocks noGrp="1"/>
+          </p:cNvSpPr>
+          <p:nvPr>
+            <p:ph type="title"/>
+          </p:nvPr>
+        </p:nvSpPr>
+        <p:spPr/>
+        <p:txBody>
+          <a:bodyPr/>
+          <a:lstStyle/>
+          <a:p>
+            <a:r>
+              <a:rPr lang="en-US" dirty="0" smtClean="0"/>
+              <a:t>Key Take </a:t>
+            </a:r>
+            <a:r>
+              <a:rPr lang="en-US" dirty="0" err="1" smtClean="0"/>
+              <a:t>Aways</a:t>
+            </a:r>
+            <a:endParaRPr lang="en-US" dirty="0"/>
+          </a:p>
+        </p:txBody>
+      </p:sp>
+      <p:sp>
+        <p:nvSpPr>
+          <p:cNvPr id="3" name="Text Placeholder 2"/>
+          <p:cNvSpPr>
+            <a:spLocks noGrp="1"/>
+          </p:cNvSpPr>
+          <p:nvPr>
+            <p:ph type="body" idx="1"/>
+          </p:nvPr>
+        </p:nvSpPr>
+        <p:spPr/>
+        <p:txBody>
+          <a:bodyPr/>
+          <a:lstStyle/>
+          <a:p>
+            <a:r>
+              <a:rPr lang="en-US" dirty="0" smtClean="0"/>
+              <a:t>“Linked” Settings</a:t>
+            </a:r>
+          </a:p>
+          <a:p>
+            <a:pPr lvl="1"/>
+            <a:r>
+              <a:rPr lang="en-US" dirty="0" smtClean="0"/>
+              <a:t>“Linked” settings need to be removed from the “extruder” tabs and into their own sections.</a:t>
+            </a:r>
+          </a:p>
+          <a:p>
+            <a:pPr lvl="1"/>
+            <a:r>
+              <a:rPr lang="en-US" dirty="0" smtClean="0"/>
+              <a:t>Each “linked” setting should be evaluated to determined its proper section.</a:t>
+            </a:r>
+          </a:p>
+          <a:p>
+            <a:endParaRPr lang="en-US" dirty="0" smtClean="0"/>
+          </a:p>
+          <a:p>
+            <a:r>
+              <a:rPr lang="en-US" dirty="0" smtClean="0"/>
+              <a:t>Profiles</a:t>
+            </a:r>
+            <a:endParaRPr lang="en-US" dirty="0"/>
+          </a:p>
+          <a:p>
+            <a:pPr lvl="1"/>
+            <a:r>
+              <a:rPr lang="en-US" dirty="0" smtClean="0"/>
+              <a:t>Profiles need to be more reusable.</a:t>
+            </a:r>
+          </a:p>
+          <a:p>
+            <a:pPr lvl="1"/>
+            <a:r>
+              <a:rPr lang="en-US" dirty="0" smtClean="0"/>
+              <a:t>Recommend making each section its own “mini profile.”</a:t>
+            </a:r>
+          </a:p>
+          <a:p>
+            <a:endParaRPr lang="en-US" dirty="0"/>
+          </a:p>
+          <a:p>
+            <a:r>
+              <a:rPr lang="en-US" dirty="0" smtClean="0"/>
+              <a:t>User Interface</a:t>
+            </a:r>
+          </a:p>
+          <a:p>
+            <a:pPr lvl="1"/>
+            <a:r>
+              <a:rPr lang="en-US" dirty="0" smtClean="0"/>
+              <a:t>More room is needed to edit settings.  Much more room.</a:t>
+            </a:r>
+          </a:p>
+          <a:p>
+            <a:endParaRPr lang="en-US" dirty="0"/>
+          </a:p>
+        </p:txBody>
+      </p:sp>
+    </p:spTree>
+    <p:extLst>
+      <p:ext uri="{BB962C8B-B14F-4D97-AF65-F5344CB8AC3E}">
+        <p14:creationId xmlns:p14="http://schemas.microsoft.com/office/powerpoint/2010/main" val="3641443312"/>
+      </p:ext>
+    </p:extLst>
+  </p:cSld>
+  <p:clrMapOvr>
+    <a:masterClrMapping/>
+  </p:clrMapOvr>
+  <p:timing>
+    <p:tnLst>
+      <p:par>
+        <p:cTn id="1" dur="indefinite" restart="never" nodeType="tmRoot"/>
+      </p:par>
+    </p:tnLst>
+  </p:timing>
+</p:sld>
+</file>
+
+<file path=ppt/slides/slide18.xml><?xml version="1.0" encoding="utf-8"?>
+<p:sld xmlns:a="http://schemas.openxmlformats.org/drawingml/2006/main" xmlns:r="http://schemas.openxmlformats.org/officeDocument/2006/relationships" xmlns:p="http://schemas.openxmlformats.org/presentationml/2006/main">
+  <p:cSld>
+    <p:spTree>
+      <p:nvGrpSpPr>
+        <p:cNvPr id="1" name=""/>
+        <p:cNvGrpSpPr/>
+        <p:nvPr/>
+      </p:nvGrpSpPr>
+      <p:grpSpPr>
+        <a:xfrm>
+          <a:off x="0" y="0"/>
+          <a:ext cx="0" cy="0"/>
+          <a:chOff x="0" y="0"/>
+          <a:chExt cx="0" cy="0"/>
+        </a:xfrm>
+      </p:grpSpPr>
+      <p:sp>
+        <p:nvSpPr>
+          <p:cNvPr id="2" name="Title 1"/>
+          <p:cNvSpPr>
+            <a:spLocks noGrp="1"/>
+          </p:cNvSpPr>
+          <p:nvPr>
+            <p:ph type="title"/>
+          </p:nvPr>
+        </p:nvSpPr>
+        <p:spPr/>
+        <p:txBody>
+          <a:bodyPr/>
+          <a:lstStyle/>
+          <a:p>
+            <a:r>
+              <a:rPr lang="en-US" dirty="0" smtClean="0"/>
+              <a:t>Conclusions</a:t>
+            </a:r>
+            <a:endParaRPr lang="en-US" dirty="0"/>
+          </a:p>
+        </p:txBody>
+      </p:sp>
+      <p:sp>
+        <p:nvSpPr>
+          <p:cNvPr id="3" name="Text Placeholder 2"/>
+          <p:cNvSpPr>
+            <a:spLocks noGrp="1"/>
+          </p:cNvSpPr>
+          <p:nvPr>
+            <p:ph type="body" idx="1"/>
+          </p:nvPr>
+        </p:nvSpPr>
+        <p:spPr/>
+        <p:txBody>
+          <a:bodyPr/>
+          <a:lstStyle/>
+          <a:p>
+            <a:r>
+              <a:rPr lang="en-US" dirty="0" smtClean="0"/>
+              <a:t>Changes would make the user interface easier to use, cut down on redundancy, and be more logical.</a:t>
+            </a:r>
+          </a:p>
+          <a:p>
+            <a:endParaRPr lang="en-US" dirty="0" smtClean="0"/>
+          </a:p>
+          <a:p>
+            <a:r>
+              <a:rPr lang="en-US" dirty="0" smtClean="0"/>
+              <a:t>Profiles would be a lot easier to use.</a:t>
+            </a:r>
+          </a:p>
+          <a:p>
+            <a:pPr lvl="1"/>
+            <a:r>
+              <a:rPr lang="en-US" dirty="0" smtClean="0"/>
+              <a:t>Cut down on profile proliferation.</a:t>
+            </a:r>
+          </a:p>
+          <a:p>
+            <a:pPr lvl="1"/>
+            <a:r>
+              <a:rPr lang="en-US" dirty="0" smtClean="0"/>
+              <a:t>Less editing of profiles to customize them for each print.</a:t>
+            </a:r>
+          </a:p>
+          <a:p>
+            <a:pPr lvl="1"/>
+            <a:endParaRPr lang="en-US" dirty="0"/>
+          </a:p>
+          <a:p>
+            <a:r>
+              <a:rPr lang="en-US" dirty="0" smtClean="0"/>
+              <a:t>Prepare </a:t>
+            </a:r>
+            <a:r>
+              <a:rPr lang="en-US" dirty="0" err="1" smtClean="0"/>
+              <a:t>Cura</a:t>
+            </a:r>
+            <a:r>
+              <a:rPr lang="en-US" dirty="0" smtClean="0"/>
+              <a:t> for the future.</a:t>
+            </a:r>
+          </a:p>
+          <a:p>
+            <a:pPr lvl="1"/>
+            <a:r>
+              <a:rPr lang="en-US" dirty="0" smtClean="0"/>
+              <a:t>More extruders are inevitable.  Without these changes the problems will only multiply.</a:t>
+            </a:r>
+          </a:p>
+          <a:p>
+            <a:endParaRPr lang="en-US" dirty="0"/>
+          </a:p>
+        </p:txBody>
+      </p:sp>
+    </p:spTree>
+    <p:extLst>
+      <p:ext uri="{BB962C8B-B14F-4D97-AF65-F5344CB8AC3E}">
+        <p14:creationId xmlns:p14="http://schemas.microsoft.com/office/powerpoint/2010/main" val="2052323181"/>
+      </p:ext>
+    </p:extLst>
+  </p:cSld>
+  <p:clrMapOvr>
+    <a:masterClrMapping/>
+  </p:clrMapOvr>
+  <p:timing>
+    <p:tnLst>
+      <p:par>
+        <p:cTn id="1" dur="indefinite" restart="never" nodeType="tmRoot"/>
+      </p:par>
+    </p:tnLst>
+  </p:timing>
+</p:sld>
+</file>
+
+<file path=ppt/slides/slide19.xml><?xml version="1.0" encoding="utf-8"?>
 <p:sld xmlns:a="http://schemas.openxmlformats.org/drawingml/2006/main" xmlns:r="http://schemas.openxmlformats.org/officeDocument/2006/relationships" xmlns:p="http://schemas.openxmlformats.org/presentationml/2006/main">
   <p:cSld>
     <p:spTree>
@@ -9548,6 +10395,240 @@
     <p:extLst>
       <p:ext uri="{BB962C8B-B14F-4D97-AF65-F5344CB8AC3E}">
         <p14:creationId xmlns:p14="http://schemas.microsoft.com/office/powerpoint/2010/main" val="3969525425"/>
+      </p:ext>
+    </p:extLst>
+  </p:cSld>
+  <p:clrMapOvr>
+    <a:masterClrMapping/>
+  </p:clrMapOvr>
+  <p:timing>
+    <p:tnLst>
+      <p:par>
+        <p:cTn id="1" dur="indefinite" restart="never" nodeType="tmRoot"/>
+      </p:par>
+    </p:tnLst>
+  </p:timing>
+</p:sld>
+</file>
+
+<file path=ppt/slides/slide20.xml><?xml version="1.0" encoding="utf-8"?>
+<p:sld xmlns:a="http://schemas.openxmlformats.org/drawingml/2006/main" xmlns:r="http://schemas.openxmlformats.org/officeDocument/2006/relationships" xmlns:p="http://schemas.openxmlformats.org/presentationml/2006/main">
+  <p:cSld>
+    <p:spTree>
+      <p:nvGrpSpPr>
+        <p:cNvPr id="1" name=""/>
+        <p:cNvGrpSpPr/>
+        <p:nvPr/>
+      </p:nvGrpSpPr>
+      <p:grpSpPr>
+        <a:xfrm>
+          <a:off x="0" y="0"/>
+          <a:ext cx="0" cy="0"/>
+          <a:chOff x="0" y="0"/>
+          <a:chExt cx="0" cy="0"/>
+        </a:xfrm>
+      </p:grpSpPr>
+      <p:grpSp>
+        <p:nvGrpSpPr>
+          <p:cNvPr id="7" name="Group 6"/>
+          <p:cNvGrpSpPr/>
+          <p:nvPr/>
+        </p:nvGrpSpPr>
+        <p:grpSpPr>
+          <a:xfrm>
+            <a:off x="8358194" y="3510099"/>
+            <a:ext cx="91440" cy="396240"/>
+            <a:chOff x="1543057" y="3210062"/>
+            <a:chExt cx="91440" cy="396240"/>
+          </a:xfrm>
+        </p:grpSpPr>
+        <p:sp>
+          <p:nvSpPr>
+            <p:cNvPr id="4" name="Oval 3"/>
+            <p:cNvSpPr>
+              <a:spLocks noChangeAspect="1"/>
+            </p:cNvSpPr>
+            <p:nvPr/>
+          </p:nvSpPr>
+          <p:spPr>
+            <a:xfrm>
+              <a:off x="1543057" y="3210062"/>
+              <a:ext cx="91440" cy="91440"/>
+            </a:xfrm>
+            <a:prstGeom prst="ellipse">
+              <a:avLst/>
+            </a:prstGeom>
+            <a:solidFill>
+              <a:srgbClr val="000000"/>
+            </a:solidFill>
+            <a:ln>
+              <a:noFill/>
+            </a:ln>
+          </p:spPr>
+          <p:style>
+            <a:lnRef idx="2">
+              <a:schemeClr val="accent1">
+                <a:shade val="50000"/>
+              </a:schemeClr>
+            </a:lnRef>
+            <a:fillRef idx="1">
+              <a:schemeClr val="accent1"/>
+            </a:fillRef>
+            <a:effectRef idx="0">
+              <a:schemeClr val="accent1"/>
+            </a:effectRef>
+            <a:fontRef idx="minor">
+              <a:schemeClr val="lt1"/>
+            </a:fontRef>
+          </p:style>
+          <p:txBody>
+            <a:bodyPr rtlCol="0" anchor="ctr"/>
+            <a:lstStyle/>
+            <a:p>
+              <a:pPr algn="ctr"/>
+              <a:endParaRPr lang="en-US"/>
+            </a:p>
+          </p:txBody>
+        </p:sp>
+        <p:sp>
+          <p:nvSpPr>
+            <p:cNvPr id="5" name="Oval 4"/>
+            <p:cNvSpPr>
+              <a:spLocks noChangeAspect="1"/>
+            </p:cNvSpPr>
+            <p:nvPr/>
+          </p:nvSpPr>
+          <p:spPr>
+            <a:xfrm>
+              <a:off x="1543057" y="3362462"/>
+              <a:ext cx="91440" cy="91440"/>
+            </a:xfrm>
+            <a:prstGeom prst="ellipse">
+              <a:avLst/>
+            </a:prstGeom>
+            <a:solidFill>
+              <a:srgbClr val="000000"/>
+            </a:solidFill>
+            <a:ln>
+              <a:noFill/>
+            </a:ln>
+          </p:spPr>
+          <p:style>
+            <a:lnRef idx="2">
+              <a:schemeClr val="accent1">
+                <a:shade val="50000"/>
+              </a:schemeClr>
+            </a:lnRef>
+            <a:fillRef idx="1">
+              <a:schemeClr val="accent1"/>
+            </a:fillRef>
+            <a:effectRef idx="0">
+              <a:schemeClr val="accent1"/>
+            </a:effectRef>
+            <a:fontRef idx="minor">
+              <a:schemeClr val="lt1"/>
+            </a:fontRef>
+          </p:style>
+          <p:txBody>
+            <a:bodyPr rtlCol="0" anchor="ctr"/>
+            <a:lstStyle/>
+            <a:p>
+              <a:pPr algn="ctr"/>
+              <a:endParaRPr lang="en-US"/>
+            </a:p>
+          </p:txBody>
+        </p:sp>
+        <p:sp>
+          <p:nvSpPr>
+            <p:cNvPr id="6" name="Oval 5"/>
+            <p:cNvSpPr>
+              <a:spLocks noChangeAspect="1"/>
+            </p:cNvSpPr>
+            <p:nvPr/>
+          </p:nvSpPr>
+          <p:spPr>
+            <a:xfrm>
+              <a:off x="1543057" y="3514862"/>
+              <a:ext cx="91440" cy="91440"/>
+            </a:xfrm>
+            <a:prstGeom prst="ellipse">
+              <a:avLst/>
+            </a:prstGeom>
+            <a:solidFill>
+              <a:srgbClr val="000000"/>
+            </a:solidFill>
+            <a:ln>
+              <a:noFill/>
+            </a:ln>
+          </p:spPr>
+          <p:style>
+            <a:lnRef idx="2">
+              <a:schemeClr val="accent1">
+                <a:shade val="50000"/>
+              </a:schemeClr>
+            </a:lnRef>
+            <a:fillRef idx="1">
+              <a:schemeClr val="accent1"/>
+            </a:fillRef>
+            <a:effectRef idx="0">
+              <a:schemeClr val="accent1"/>
+            </a:effectRef>
+            <a:fontRef idx="minor">
+              <a:schemeClr val="lt1"/>
+            </a:fontRef>
+          </p:style>
+          <p:txBody>
+            <a:bodyPr rtlCol="0" anchor="ctr"/>
+            <a:lstStyle/>
+            <a:p>
+              <a:pPr algn="ctr"/>
+              <a:endParaRPr lang="en-US"/>
+            </a:p>
+          </p:txBody>
+        </p:sp>
+      </p:grpSp>
+      <p:sp>
+        <p:nvSpPr>
+          <p:cNvPr id="8" name="Title 7"/>
+          <p:cNvSpPr>
+            <a:spLocks noGrp="1"/>
+          </p:cNvSpPr>
+          <p:nvPr>
+            <p:ph type="title"/>
+          </p:nvPr>
+        </p:nvSpPr>
+        <p:spPr/>
+        <p:txBody>
+          <a:bodyPr/>
+          <a:lstStyle/>
+          <a:p>
+            <a:endParaRPr lang="en-US"/>
+          </a:p>
+        </p:txBody>
+      </p:sp>
+      <p:sp>
+        <p:nvSpPr>
+          <p:cNvPr id="9" name="Text Placeholder 8"/>
+          <p:cNvSpPr>
+            <a:spLocks noGrp="1"/>
+          </p:cNvSpPr>
+          <p:nvPr>
+            <p:ph type="body" idx="1"/>
+          </p:nvPr>
+        </p:nvSpPr>
+        <p:spPr/>
+        <p:txBody>
+          <a:bodyPr/>
+          <a:lstStyle/>
+          <a:p>
+            <a:endParaRPr lang="en-US" dirty="0"/>
+          </a:p>
+        </p:txBody>
+      </p:sp>
+    </p:spTree>
+    <p:extLst>
+      <p:ext uri="{BB962C8B-B14F-4D97-AF65-F5344CB8AC3E}">
+        <p14:creationId xmlns:p14="http://schemas.microsoft.com/office/powerpoint/2010/main" val="3173379940"/>
       </p:ext>
     </p:extLst>
   </p:cSld>
@@ -9881,39 +10962,13 @@
             </a:pPr>
             <a:r>
               <a:rPr lang="en" sz="2400" dirty="0" smtClean="0"/>
-              <a:t>Profiles are extremely difficult to work with.</a:t>
+              <a:t>Profiles are extremely difficult to work with</a:t>
             </a:r>
-          </a:p>
-          <a:p>
-            <a:pPr marL="0" lvl="0" indent="0" algn="l" rtl="0">
-              <a:spcBef>
-                <a:spcPts val="0"/>
-              </a:spcBef>
-              <a:spcAft>
-                <a:spcPts val="1600"/>
-              </a:spcAft>
-              <a:buNone/>
-            </a:pPr>
             <a:r>
               <a:rPr lang="en" sz="2400" dirty="0" smtClean="0"/>
-              <a:t>Profiles need to be more “reusable” and flexible.</a:t>
+              <a:t>.</a:t>
             </a:r>
-          </a:p>
-          <a:p>
-            <a:pPr marL="0" lvl="0" indent="0" algn="l" rtl="0">
-              <a:spcBef>
-                <a:spcPts val="0"/>
-              </a:spcBef>
-              <a:spcAft>
-                <a:spcPts val="1600"/>
-              </a:spcAft>
-              <a:buNone/>
-            </a:pPr>
-            <a:r>
-              <a:rPr lang="en" sz="2400" dirty="0" smtClean="0"/>
-              <a:t>The user interface is organized poorly.</a:t>
-            </a:r>
-            <a:endParaRPr lang="en" sz="2400" dirty="0"/>
+            <a:endParaRPr lang="en" sz="2400" dirty="0" smtClean="0"/>
           </a:p>
         </p:txBody>
       </p:sp>
@@ -9951,7 +11006,7 @@
       </p:grpSpPr>
       <p:sp>
         <p:nvSpPr>
-          <p:cNvPr id="5" name="Title 4"/>
+          <p:cNvPr id="2" name="Title 1"/>
           <p:cNvSpPr>
             <a:spLocks noGrp="1"/>
           </p:cNvSpPr>
@@ -9964,13 +11019,16 @@
           <a:bodyPr/>
           <a:lstStyle/>
           <a:p>
-            <a:endParaRPr lang="en-US"/>
+            <a:r>
+              <a:rPr lang="en-US" dirty="0"/>
+              <a:t>Profile Problems</a:t>
+            </a:r>
           </a:p>
         </p:txBody>
       </p:sp>
       <p:sp>
         <p:nvSpPr>
-          <p:cNvPr id="6" name="Text Placeholder 5"/>
+          <p:cNvPr id="3" name="Text Placeholder 2"/>
           <p:cNvSpPr>
             <a:spLocks noGrp="1"/>
           </p:cNvSpPr>
@@ -9983,33 +11041,66 @@
           <a:bodyPr/>
           <a:lstStyle/>
           <a:p>
-            <a:endParaRPr lang="en-US"/>
-          </a:p>
-        </p:txBody>
-      </p:sp>
-      <p:sp>
-        <p:nvSpPr>
-          <p:cNvPr id="7" name="Text Placeholder 6"/>
-          <p:cNvSpPr>
-            <a:spLocks noGrp="1"/>
-          </p:cNvSpPr>
-          <p:nvPr>
-            <p:ph type="body" idx="13"/>
-          </p:nvPr>
-        </p:nvSpPr>
-        <p:spPr/>
-        <p:txBody>
-          <a:bodyPr/>
-          <a:lstStyle/>
-          <a:p>
-            <a:endParaRPr lang="en-US"/>
+            <a:r>
+              <a:rPr lang="en-US" sz="2000" dirty="0" smtClean="0"/>
+              <a:t>There are 3 main issues with profiles.</a:t>
+            </a:r>
+          </a:p>
+          <a:p>
+            <a:pPr lvl="1"/>
+            <a:r>
+              <a:rPr lang="en-US" dirty="0" smtClean="0"/>
+              <a:t>Profiles </a:t>
+            </a:r>
+            <a:r>
+              <a:rPr lang="en-US" dirty="0"/>
+              <a:t>are extremely difficult to </a:t>
+            </a:r>
+            <a:r>
+              <a:rPr lang="en-US" dirty="0" smtClean="0"/>
+              <a:t>maintain.</a:t>
+            </a:r>
+          </a:p>
+          <a:p>
+            <a:pPr lvl="1"/>
+            <a:r>
+              <a:rPr lang="en-US" dirty="0" smtClean="0"/>
+              <a:t>The </a:t>
+            </a:r>
+            <a:r>
+              <a:rPr lang="en-US" dirty="0"/>
+              <a:t>user </a:t>
+            </a:r>
+            <a:r>
+              <a:rPr lang="en-US" dirty="0" smtClean="0"/>
+              <a:t>interface </a:t>
+            </a:r>
+            <a:r>
+              <a:rPr lang="en-US" dirty="0"/>
+              <a:t>is organized poorly</a:t>
+            </a:r>
+            <a:r>
+              <a:rPr lang="en-US" dirty="0" smtClean="0"/>
+              <a:t>.</a:t>
+            </a:r>
+          </a:p>
+          <a:p>
+            <a:pPr lvl="1"/>
+            <a:r>
+              <a:rPr lang="en-US" dirty="0" smtClean="0"/>
+              <a:t>The user interface needs more space to work with profiles.</a:t>
+            </a:r>
+            <a:endParaRPr lang="en-US" dirty="0"/>
+          </a:p>
+          <a:p>
+            <a:endParaRPr lang="en-US" dirty="0"/>
           </a:p>
         </p:txBody>
       </p:sp>
     </p:spTree>
     <p:extLst>
       <p:ext uri="{BB962C8B-B14F-4D97-AF65-F5344CB8AC3E}">
-        <p14:creationId xmlns:p14="http://schemas.microsoft.com/office/powerpoint/2010/main" val="2701720813"/>
+        <p14:creationId xmlns:p14="http://schemas.microsoft.com/office/powerpoint/2010/main" val="262603803"/>
       </p:ext>
     </p:extLst>
   </p:cSld>
@@ -10045,7 +11136,7 @@
       </p:grpSpPr>
       <p:sp>
         <p:nvSpPr>
-          <p:cNvPr id="5" name="Title 4"/>
+          <p:cNvPr id="2" name="Title 1"/>
           <p:cNvSpPr>
             <a:spLocks noGrp="1"/>
           </p:cNvSpPr>
@@ -10060,7 +11151,7 @@
           <a:p>
             <a:r>
               <a:rPr lang="en-US" dirty="0" smtClean="0"/>
-              <a:t>Problems</a:t>
+              <a:t>Profile Problems</a:t>
             </a:r>
             <a:endParaRPr lang="en-US" dirty="0"/>
           </a:p>
@@ -10082,151 +11173,39 @@
           <a:lstStyle/>
           <a:p>
             <a:r>
-              <a:rPr lang="en-US" dirty="0"/>
-              <a:t>Duplication of controls on User </a:t>
+              <a:rPr lang="en-US" dirty="0" smtClean="0"/>
+              <a:t>Given the large number of settings and way profiles are defined, maintaining profiles very rapidly becomes a logistical impossibility.</a:t>
+            </a:r>
+          </a:p>
+          <a:p>
+            <a:pPr lvl="1"/>
+            <a:r>
+              <a:rPr lang="en-US" dirty="0" smtClean="0"/>
+              <a:t>Profile and settings </a:t>
+            </a:r>
+            <a:r>
+              <a:rPr lang="en-US" i="1" dirty="0" smtClean="0"/>
+              <a:t>count</a:t>
             </a:r>
             <a:r>
               <a:rPr lang="en-US" dirty="0" smtClean="0"/>
-              <a:t>Interface</a:t>
+              <a:t> explosion.</a:t>
             </a:r>
           </a:p>
           <a:p>
             <a:pPr lvl="1"/>
             <a:r>
-              <a:rPr lang="en-US" dirty="0"/>
-              <a:t>2 controls for 1 setting is </a:t>
-            </a:r>
-            <a:r>
-              <a:rPr lang="en-US" i="1" dirty="0" smtClean="0">
-                <a:solidFill>
-                  <a:srgbClr val="8E0000"/>
-                </a:solidFill>
-              </a:rPr>
-              <a:t>red flag</a:t>
-            </a:r>
-            <a:r>
               <a:rPr lang="en-US" dirty="0" smtClean="0"/>
-              <a:t> </a:t>
-            </a:r>
-            <a:r>
-              <a:rPr lang="en-US" dirty="0"/>
-              <a:t>there is a design </a:t>
-            </a:r>
-            <a:r>
-              <a:rPr lang="en-US" dirty="0" smtClean="0"/>
-              <a:t>issue</a:t>
-            </a:r>
-          </a:p>
-          <a:p>
-            <a:pPr lvl="1"/>
-            <a:r>
-              <a:rPr lang="en-US" dirty="0"/>
-              <a:t>Users find it confusing that settings are </a:t>
-            </a:r>
-            <a:r>
-              <a:rPr lang="en-US" dirty="0" smtClean="0"/>
-              <a:t>linked</a:t>
-            </a:r>
-          </a:p>
-          <a:p>
-            <a:pPr lvl="2"/>
-            <a:r>
-              <a:rPr lang="en-US" dirty="0" smtClean="0"/>
-              <a:t>Non-standard/unique approaches are best avoided</a:t>
+              <a:t>It is not feasible to maintain profiles for each type of printing scenario.</a:t>
             </a:r>
             <a:endParaRPr lang="en-US" dirty="0"/>
           </a:p>
-          <a:p>
-            <a:endParaRPr lang="en-US" dirty="0"/>
-          </a:p>
         </p:txBody>
       </p:sp>
-      <p:sp>
-        <p:nvSpPr>
-          <p:cNvPr id="6" name="Text Placeholder 5"/>
-          <p:cNvSpPr>
-            <a:spLocks noGrp="1"/>
-          </p:cNvSpPr>
-          <p:nvPr>
-            <p:ph type="body" idx="4294967295"/>
-          </p:nvPr>
-        </p:nvSpPr>
-        <p:spPr>
-          <a:xfrm>
-            <a:off x="4795454" y="1216650"/>
-            <a:ext cx="4112802" cy="3798000"/>
-          </a:xfrm>
-        </p:spPr>
-        <p:txBody>
-          <a:bodyPr/>
-          <a:lstStyle/>
-          <a:p>
-            <a:endParaRPr lang="en-US" dirty="0"/>
-          </a:p>
-        </p:txBody>
-      </p:sp>
-      <p:pic>
-        <p:nvPicPr>
-          <p:cNvPr id="10" name="Picture 9"/>
-          <p:cNvPicPr>
-            <a:picLocks noChangeAspect="1"/>
-          </p:cNvPicPr>
-          <p:nvPr/>
-        </p:nvPicPr>
-        <p:blipFill>
-          <a:blip r:embed="rId2"/>
-          <a:stretch>
-            <a:fillRect/>
-          </a:stretch>
-        </p:blipFill>
-        <p:spPr>
-          <a:xfrm>
-            <a:off x="5929914" y="3094410"/>
-            <a:ext cx="3048983" cy="1920240"/>
-          </a:xfrm>
-          <a:prstGeom prst="rect">
-            <a:avLst/>
-          </a:prstGeom>
-          <a:ln w="19050">
-            <a:solidFill>
-              <a:schemeClr val="bg2"/>
-            </a:solidFill>
-          </a:ln>
-        </p:spPr>
-      </p:pic>
-      <p:pic>
-        <p:nvPicPr>
-          <p:cNvPr id="11" name="Picture 10"/>
-          <p:cNvPicPr>
-            <a:picLocks noChangeAspect="1"/>
-          </p:cNvPicPr>
-          <p:nvPr/>
-        </p:nvPicPr>
-        <p:blipFill>
-          <a:blip r:embed="rId3"/>
-          <a:stretch>
-            <a:fillRect/>
-          </a:stretch>
-        </p:blipFill>
-        <p:spPr>
-          <a:xfrm>
-            <a:off x="4344661" y="1065714"/>
-            <a:ext cx="3048983" cy="1920240"/>
-          </a:xfrm>
-          <a:prstGeom prst="rect">
-            <a:avLst/>
-          </a:prstGeom>
-          <a:ln w="19050">
-            <a:solidFill>
-              <a:schemeClr val="bg2"/>
-            </a:solidFill>
-          </a:ln>
-        </p:spPr>
-      </p:pic>
     </p:spTree>
     <p:extLst>
       <p:ext uri="{BB962C8B-B14F-4D97-AF65-F5344CB8AC3E}">
-        <p14:creationId xmlns:p14="http://schemas.microsoft.com/office/powerpoint/2010/main" val="2503677090"/>
+        <p14:creationId xmlns:p14="http://schemas.microsoft.com/office/powerpoint/2010/main" val="1760617191"/>
       </p:ext>
     </p:extLst>
   </p:cSld>
@@ -10262,7 +11241,7 @@
       </p:grpSpPr>
       <p:sp>
         <p:nvSpPr>
-          <p:cNvPr id="2" name="Title 1"/>
+          <p:cNvPr id="5" name="Title 4"/>
           <p:cNvSpPr>
             <a:spLocks noGrp="1"/>
           </p:cNvSpPr>
@@ -10275,13 +11254,17 @@
           <a:bodyPr/>
           <a:lstStyle/>
           <a:p>
-            <a:endParaRPr lang="en-US"/>
+            <a:r>
+              <a:rPr lang="en-US" dirty="0" smtClean="0"/>
+              <a:t>Profile Difficulties</a:t>
+            </a:r>
+            <a:endParaRPr lang="en-US" dirty="0"/>
           </a:p>
         </p:txBody>
       </p:sp>
       <p:sp>
         <p:nvSpPr>
-          <p:cNvPr id="3" name="Text Placeholder 2"/>
+          <p:cNvPr id="6" name="Text Placeholder 5"/>
           <p:cNvSpPr>
             <a:spLocks noGrp="1"/>
           </p:cNvSpPr>
@@ -10294,13 +11277,50 @@
           <a:bodyPr/>
           <a:lstStyle/>
           <a:p>
-            <a:endParaRPr lang="en-US"/>
+            <a:r>
+              <a:rPr lang="en-US" dirty="0" smtClean="0"/>
+              <a:t>Profiles contain a very large number of settings.</a:t>
+            </a:r>
+          </a:p>
+          <a:p>
+            <a:r>
+              <a:rPr lang="en-US" dirty="0" smtClean="0"/>
+              <a:t>Changing a single settings results in a new profile.</a:t>
+            </a:r>
+          </a:p>
+          <a:p>
+            <a:r>
+              <a:rPr lang="en-US" dirty="0" smtClean="0"/>
+              <a:t>This causes the total number of stores settings to multiply very rapidly.</a:t>
+            </a:r>
+          </a:p>
+          <a:p>
+            <a:endParaRPr lang="en-US" dirty="0" smtClean="0"/>
+          </a:p>
+          <a:p>
+            <a:r>
+              <a:rPr lang="en-US" dirty="0" smtClean="0"/>
+              <a:t>Profiles </a:t>
+            </a:r>
+            <a:r>
+              <a:rPr lang="en-US" dirty="0"/>
+              <a:t>need to be more “reusable” and flexible.</a:t>
+            </a:r>
+          </a:p>
+          <a:p>
+            <a:r>
+              <a:rPr lang="en-US" dirty="0"/>
+              <a:t>The user interface is organized poorly.</a:t>
+            </a:r>
+          </a:p>
+          <a:p>
+            <a:endParaRPr lang="en-US" dirty="0"/>
           </a:p>
         </p:txBody>
       </p:sp>
       <p:sp>
         <p:nvSpPr>
-          <p:cNvPr id="4" name="Text Placeholder 3"/>
+          <p:cNvPr id="7" name="Text Placeholder 6"/>
           <p:cNvSpPr>
             <a:spLocks noGrp="1"/>
           </p:cNvSpPr>
@@ -10320,7 +11340,7 @@
     </p:spTree>
     <p:extLst>
       <p:ext uri="{BB962C8B-B14F-4D97-AF65-F5344CB8AC3E}">
-        <p14:creationId xmlns:p14="http://schemas.microsoft.com/office/powerpoint/2010/main" val="2970295335"/>
+        <p14:creationId xmlns:p14="http://schemas.microsoft.com/office/powerpoint/2010/main" val="2701720813"/>
       </p:ext>
     </p:extLst>
   </p:cSld>
@@ -10369,11 +11389,7 @@
           <a:bodyPr/>
           <a:lstStyle/>
           <a:p>
-            <a:r>
-              <a:rPr lang="en-US" dirty="0" smtClean="0"/>
-              <a:t>Profile Demonstration Software</a:t>
-            </a:r>
-            <a:endParaRPr lang="en-US" dirty="0"/>
+            <a:endParaRPr lang="en-US"/>
           </a:p>
         </p:txBody>
       </p:sp>
@@ -10387,75 +11403,62 @@
             <p:ph type="body" idx="1"/>
           </p:nvPr>
         </p:nvSpPr>
-        <p:spPr>
-          <a:xfrm>
-            <a:off x="264299" y="1216650"/>
-            <a:ext cx="5473771" cy="3798000"/>
-          </a:xfrm>
-        </p:spPr>
+        <p:spPr/>
         <p:txBody>
           <a:bodyPr/>
           <a:lstStyle/>
           <a:p>
-            <a:r>
-              <a:rPr lang="en-US" dirty="0" smtClean="0"/>
-              <a:t>A basic example to demonstrate concepts.</a:t>
-            </a:r>
-          </a:p>
-          <a:p>
-            <a:pPr lvl="1"/>
-            <a:r>
-              <a:rPr lang="en-US" dirty="0" smtClean="0"/>
-              <a:t>A minimum number of settings are incorporated.</a:t>
-            </a:r>
-          </a:p>
-          <a:p>
-            <a:pPr lvl="1"/>
-            <a:r>
-              <a:rPr lang="en-US" dirty="0" smtClean="0"/>
-              <a:t>Data validation is not complete.</a:t>
-            </a:r>
-          </a:p>
-          <a:p>
-            <a:r>
-              <a:rPr lang="en-US" dirty="0" smtClean="0"/>
-              <a:t>Not intended as “the” solution.</a:t>
-            </a:r>
-          </a:p>
-          <a:p>
-            <a:pPr lvl="1"/>
-            <a:r>
-              <a:rPr lang="en-US" dirty="0" smtClean="0"/>
-              <a:t>There are many possible valid implementations.</a:t>
-            </a:r>
-          </a:p>
-          <a:p>
-            <a:r>
-              <a:rPr lang="en-US" dirty="0" smtClean="0"/>
-              <a:t>Please focus only on the concepts and learnings.</a:t>
-            </a:r>
-          </a:p>
-          <a:p>
-            <a:pPr lvl="1"/>
-            <a:r>
-              <a:rPr lang="en-US" dirty="0" smtClean="0"/>
-              <a:t>Take away the </a:t>
-            </a:r>
-            <a:r>
-              <a:rPr lang="en-US" i="1" dirty="0" smtClean="0"/>
-              <a:t>Big Picture</a:t>
-            </a:r>
-            <a:r>
-              <a:rPr lang="en-US" dirty="0" smtClean="0"/>
-              <a:t>.</a:t>
-            </a:r>
+            <a:endParaRPr lang="en-US"/>
           </a:p>
         </p:txBody>
       </p:sp>
+      <p:sp>
+        <p:nvSpPr>
+          <p:cNvPr id="4" name="Text Placeholder 3"/>
+          <p:cNvSpPr>
+            <a:spLocks noGrp="1"/>
+          </p:cNvSpPr>
+          <p:nvPr>
+            <p:ph type="body" idx="13"/>
+          </p:nvPr>
+        </p:nvSpPr>
+        <p:spPr/>
+        <p:txBody>
+          <a:bodyPr/>
+          <a:lstStyle/>
+          <a:p>
+            <a:endParaRPr lang="en-US"/>
+          </a:p>
+        </p:txBody>
+      </p:sp>
+      <p:pic>
+        <p:nvPicPr>
+          <p:cNvPr id="5" name="Picture 4"/>
+          <p:cNvPicPr>
+            <a:picLocks noChangeAspect="1"/>
+          </p:cNvPicPr>
+          <p:nvPr/>
+        </p:nvPicPr>
+        <p:blipFill>
+          <a:blip r:embed="rId2"/>
+          <a:stretch>
+            <a:fillRect/>
+          </a:stretch>
+        </p:blipFill>
+        <p:spPr>
+          <a:xfrm>
+            <a:off x="3785910" y="985013"/>
+            <a:ext cx="3972479" cy="4029637"/>
+          </a:xfrm>
+          <a:prstGeom prst="rect">
+            <a:avLst/>
+          </a:prstGeom>
+        </p:spPr>
+      </p:pic>
     </p:spTree>
     <p:extLst>
       <p:ext uri="{BB962C8B-B14F-4D97-AF65-F5344CB8AC3E}">
-        <p14:creationId xmlns:p14="http://schemas.microsoft.com/office/powerpoint/2010/main" val="1099706727"/>
+        <p14:creationId xmlns:p14="http://schemas.microsoft.com/office/powerpoint/2010/main" val="4294438128"/>
       </p:ext>
     </p:extLst>
   </p:cSld>

</xml_diff>